<commit_message>
fixed dates in slides
</commit_message>
<xml_diff>
--- a/2023-FALL/Week15.pptx
+++ b/2023-FALL/Week15.pptx
@@ -262,7 +262,7 @@
           <a:p>
             <a:fld id="{2B1919C7-6BC3-4736-AC32-A62C7B81C82C}" type="datetimeFigureOut">
               <a:rPr lang="en-US" smtClean="0"/>
-              <a:t>11/30/2023</a:t>
+              <a:t>12/7/2023</a:t>
             </a:fld>
             <a:endParaRPr lang="en-US"/>
           </a:p>
@@ -460,7 +460,7 @@
           <a:p>
             <a:fld id="{2B1919C7-6BC3-4736-AC32-A62C7B81C82C}" type="datetimeFigureOut">
               <a:rPr lang="en-US" smtClean="0"/>
-              <a:t>11/30/2023</a:t>
+              <a:t>12/7/2023</a:t>
             </a:fld>
             <a:endParaRPr lang="en-US"/>
           </a:p>
@@ -668,7 +668,7 @@
           <a:p>
             <a:fld id="{2B1919C7-6BC3-4736-AC32-A62C7B81C82C}" type="datetimeFigureOut">
               <a:rPr lang="en-US" smtClean="0"/>
-              <a:t>11/30/2023</a:t>
+              <a:t>12/7/2023</a:t>
             </a:fld>
             <a:endParaRPr lang="en-US"/>
           </a:p>
@@ -866,7 +866,7 @@
           <a:p>
             <a:fld id="{2B1919C7-6BC3-4736-AC32-A62C7B81C82C}" type="datetimeFigureOut">
               <a:rPr lang="en-US" smtClean="0"/>
-              <a:t>11/30/2023</a:t>
+              <a:t>12/7/2023</a:t>
             </a:fld>
             <a:endParaRPr lang="en-US"/>
           </a:p>
@@ -1141,7 +1141,7 @@
           <a:p>
             <a:fld id="{2B1919C7-6BC3-4736-AC32-A62C7B81C82C}" type="datetimeFigureOut">
               <a:rPr lang="en-US" smtClean="0"/>
-              <a:t>11/30/2023</a:t>
+              <a:t>12/7/2023</a:t>
             </a:fld>
             <a:endParaRPr lang="en-US"/>
           </a:p>
@@ -1406,7 +1406,7 @@
           <a:p>
             <a:fld id="{2B1919C7-6BC3-4736-AC32-A62C7B81C82C}" type="datetimeFigureOut">
               <a:rPr lang="en-US" smtClean="0"/>
-              <a:t>11/30/2023</a:t>
+              <a:t>12/7/2023</a:t>
             </a:fld>
             <a:endParaRPr lang="en-US"/>
           </a:p>
@@ -1818,7 +1818,7 @@
           <a:p>
             <a:fld id="{2B1919C7-6BC3-4736-AC32-A62C7B81C82C}" type="datetimeFigureOut">
               <a:rPr lang="en-US" smtClean="0"/>
-              <a:t>11/30/2023</a:t>
+              <a:t>12/7/2023</a:t>
             </a:fld>
             <a:endParaRPr lang="en-US"/>
           </a:p>
@@ -1959,7 +1959,7 @@
           <a:p>
             <a:fld id="{2B1919C7-6BC3-4736-AC32-A62C7B81C82C}" type="datetimeFigureOut">
               <a:rPr lang="en-US" smtClean="0"/>
-              <a:t>11/30/2023</a:t>
+              <a:t>12/7/2023</a:t>
             </a:fld>
             <a:endParaRPr lang="en-US"/>
           </a:p>
@@ -2072,7 +2072,7 @@
           <a:p>
             <a:fld id="{2B1919C7-6BC3-4736-AC32-A62C7B81C82C}" type="datetimeFigureOut">
               <a:rPr lang="en-US" smtClean="0"/>
-              <a:t>11/30/2023</a:t>
+              <a:t>12/7/2023</a:t>
             </a:fld>
             <a:endParaRPr lang="en-US"/>
           </a:p>
@@ -2383,7 +2383,7 @@
           <a:p>
             <a:fld id="{2B1919C7-6BC3-4736-AC32-A62C7B81C82C}" type="datetimeFigureOut">
               <a:rPr lang="en-US" smtClean="0"/>
-              <a:t>11/30/2023</a:t>
+              <a:t>12/7/2023</a:t>
             </a:fld>
             <a:endParaRPr lang="en-US"/>
           </a:p>
@@ -2671,7 +2671,7 @@
           <a:p>
             <a:fld id="{2B1919C7-6BC3-4736-AC32-A62C7B81C82C}" type="datetimeFigureOut">
               <a:rPr lang="en-US" smtClean="0"/>
-              <a:t>11/30/2023</a:t>
+              <a:t>12/7/2023</a:t>
             </a:fld>
             <a:endParaRPr lang="en-US"/>
           </a:p>
@@ -2912,7 +2912,7 @@
           <a:p>
             <a:fld id="{2B1919C7-6BC3-4736-AC32-A62C7B81C82C}" type="datetimeFigureOut">
               <a:rPr lang="en-US" smtClean="0"/>
-              <a:t>11/30/2023</a:t>
+              <a:t>12/7/2023</a:t>
             </a:fld>
             <a:endParaRPr lang="en-US"/>
           </a:p>
@@ -3492,7 +3492,7 @@
           <a:p>
             <a:r>
               <a:rPr lang="en-US" dirty="0"/>
-              <a:t>Final Project (Due: 05-03-2023 11:59PM)</a:t>
+              <a:t>Final Project (Due: 12-13-2023 11:59PM)</a:t>
             </a:r>
           </a:p>
           <a:p>
@@ -3531,8 +3531,13 @@
           <a:p>
             <a:r>
               <a:rPr lang="en-US" dirty="0"/>
-              <a:t>ALL late homework needs to be in by 05-03</a:t>
-            </a:r>
+              <a:t>ALL late homework needs to be in </a:t>
+            </a:r>
+            <a:r>
+              <a:rPr lang="en-US"/>
+              <a:t>by 12-13</a:t>
+            </a:r>
+            <a:endParaRPr lang="en-US" dirty="0"/>
           </a:p>
           <a:p>
             <a:r>

</xml_diff>